<commit_message>
add scripts for ds_intro_slides.pptx
</commit_message>
<xml_diff>
--- a/slides/datastructures/ds_intro_slides.pptx
+++ b/slides/datastructures/ds_intro_slides.pptx
@@ -330,6 +330,11 @@
       </a:defRPr>
     </a:lvl9pPr>
   </p:defaultTextStyle>
+  <p:extLst>
+    <p:ext uri="{EFAFB233-063F-42B5-8137-9DF3F51BA10A}">
+      <p15:sldGuideLst xmlns:p15="http://schemas.microsoft.com/office/powerpoint/2012/main"/>
+    </p:ext>
+  </p:extLst>
 </p:presentation>
 </file>
 
@@ -576,8 +581,16 @@
           <a:lstStyle/>
           <a:p>
             <a:r>
-              <a:t>Hello and welcome to this new series on Data Structures. In these first few videos I want to lay the foundation of some core concepts you will need throughout these video tutorials. Let’s get started with the basics.</a:t>
-            </a:r>
+              <a:rPr lang="zh-CN" altLang="en-US" sz="2200" baseline="0" dirty="0">
+                <a:latin typeface="+mn-lt"/>
+                <a:ea typeface="+mn-ea"/>
+              </a:rPr>
+              <a:t>你好，欢迎来到波波新推出的数据结构课程。在前面的几个视频中，我会解释一些核心概念，理解这些概念，可以为你学习后续的课程打下一个良好的基础，因为在我们后续的课程中，我们会不断地应用到这些概念。好，让我们从基础开始。</a:t>
+            </a:r>
+            <a:endParaRPr lang="en-US" altLang="zh-CN" sz="2200" baseline="0" dirty="0">
+              <a:latin typeface="+mn-lt"/>
+              <a:ea typeface="+mn-ea"/>
+            </a:endParaRPr>
           </a:p>
         </p:txBody>
       </p:sp>
@@ -1342,24 +1355,30 @@
           <a:lstStyle/>
           <a:p>
             <a:r>
-              <a:t>Let us begin by answering the question: What is a DS? One definition I like is that …</a:t>
-            </a:r>
-          </a:p>
-          <a:p>
-            <a:endParaRPr/>
-          </a:p>
-          <a:p>
-            <a:r>
-              <a:t>Read on slide</a:t>
-            </a:r>
-          </a:p>
-          <a:p>
-            <a:endParaRPr/>
-          </a:p>
-          <a:p>
-            <a:r>
-              <a:t>This is all a data structure really is, it is a way of organizing data, in some fashion so that later on it can be accessed, queried, updated and so on in an effective manner.</a:t>
-            </a:r>
+              <a:rPr lang="zh-CN" altLang="en-US" dirty="0"/>
+              <a:t>那么什么是数据结构呢？我比较喜欢的一个定义是这样的：</a:t>
+            </a:r>
+            <a:endParaRPr lang="en-US" altLang="zh-CN" dirty="0"/>
+          </a:p>
+          <a:p>
+            <a:endParaRPr lang="en-US" altLang="zh-CN" dirty="0"/>
+          </a:p>
+          <a:p>
+            <a:r>
+              <a:rPr lang="zh-CN" altLang="en-US" dirty="0"/>
+              <a:t>数据结构是组织数据的一种方式，它的目标是有效的使用数据。</a:t>
+            </a:r>
+            <a:endParaRPr dirty="0"/>
+          </a:p>
+          <a:p>
+            <a:endParaRPr lang="en-US" altLang="zh-CN" dirty="0"/>
+          </a:p>
+          <a:p>
+            <a:r>
+              <a:rPr lang="zh-CN" altLang="en-US" dirty="0"/>
+              <a:t>这就是数据结构的定义，它是一种组织数据的方式，方便我们后续有效地去访问、查询或者更新数据。</a:t>
+            </a:r>
+            <a:endParaRPr dirty="0"/>
           </a:p>
         </p:txBody>
       </p:sp>
@@ -1431,27 +1450,57 @@
           <a:lstStyle/>
           <a:p>
             <a:r>
-              <a:t>We now know what a DS is, but why do you care? Why do you want to be familiar with and utilize these entities </a:t>
-            </a:r>
-          </a:p>
-          <a:p>
-            <a:endParaRPr/>
-          </a:p>
-          <a:p>
-            <a:r>
-              <a:t>Read Slide</a:t>
-            </a:r>
-          </a:p>
-          <a:p>
-            <a:endParaRPr/>
-          </a:p>
-          <a:p>
-            <a:r>
-              <a:t>As a side note, the one major distinction I have noticed from bad, mediocre to excellent programmers is that the ones who really excel are the ones who fundamentally understand how and when to use the appropriate data structure for the task they’re trying to finish. Data structures can make the difference between an ok product and an outstanding one, it is no wonder that every computer science under graduate student is required to take a course in data structures. </a:t>
-            </a:r>
-          </a:p>
-          <a:p>
-            <a:endParaRPr/>
+              <a:rPr lang="zh-CN" altLang="en-US" dirty="0"/>
+              <a:t>知道了什么是数据结构，那么为什么数据结构如此重要？我们为什么要学数据结构呢？</a:t>
+            </a:r>
+            <a:r>
+              <a:rPr dirty="0"/>
+              <a:t> </a:t>
+            </a:r>
+          </a:p>
+          <a:p>
+            <a:endParaRPr lang="en-US" altLang="zh-CN" dirty="0"/>
+          </a:p>
+          <a:p>
+            <a:r>
+              <a:rPr lang="zh-CN" altLang="en-US" dirty="0"/>
+              <a:t>我这边总结了三点：</a:t>
+            </a:r>
+            <a:endParaRPr lang="en-US" altLang="zh-CN" dirty="0"/>
+          </a:p>
+          <a:p>
+            <a:endParaRPr lang="en-US" altLang="zh-CN" dirty="0"/>
+          </a:p>
+          <a:p>
+            <a:r>
+              <a:rPr lang="zh-CN" altLang="en-US" dirty="0"/>
+              <a:t>第一点是，数据结构是创建高效算法的基础。</a:t>
+            </a:r>
+            <a:endParaRPr lang="en-US" altLang="zh-CN" dirty="0"/>
+          </a:p>
+          <a:p>
+            <a:r>
+              <a:rPr lang="zh-CN" altLang="en-US" dirty="0"/>
+              <a:t>第二点是，数据结构可以帮助我们管理和组织数据。</a:t>
+            </a:r>
+            <a:endParaRPr lang="en-US" altLang="zh-CN" dirty="0"/>
+          </a:p>
+          <a:p>
+            <a:r>
+              <a:rPr lang="zh-CN" altLang="en-US" dirty="0"/>
+              <a:t>第三点是，数据结构让代码变得整洁清晰，并且易于理解。</a:t>
+            </a:r>
+            <a:endParaRPr lang="en-US" altLang="zh-CN" dirty="0"/>
+          </a:p>
+          <a:p>
+            <a:endParaRPr dirty="0"/>
+          </a:p>
+          <a:p>
+            <a:r>
+              <a:rPr lang="zh-CN" altLang="en-US" dirty="0"/>
+              <a:t>顺便提一下，我发现优秀程序员和不合格的，或者一般程序员之间的主要差异在于，优秀程序员能够合理的选择和应用数据结构，来解决他们手头的编程任务。可以说，数据结构就是普通程序员和优先程序员之间的差异所在。这也说明了为什么每一个计算机专业的本科生都需要学习数据结构这门课程。</a:t>
+            </a:r>
+            <a:endParaRPr dirty="0"/>
           </a:p>
         </p:txBody>
       </p:sp>
@@ -1523,8 +1572,10 @@
           <a:lstStyle/>
           <a:p>
             <a:r>
-              <a:t>It is strange that before we even begin talking about data structures that we need to talk about the abstraction of data structures. What i’m talking about an the concept of an abstract data type.</a:t>
-            </a:r>
+              <a:rPr lang="zh-CN" altLang="en-US" dirty="0"/>
+              <a:t>在正式讲解数据结构之前，我们先要来讲一下数据结构的抽象。这个说法本身有点抽象，其实我要讲的是抽象数据类型这个概念。</a:t>
+            </a:r>
+            <a:endParaRPr dirty="0"/>
           </a:p>
         </p:txBody>
       </p:sp>
@@ -1596,32 +1647,117 @@
           <a:lstStyle/>
           <a:p>
             <a:r>
-              <a:t>What is an ADT and how does it differ from a DS? Well the answer is that…</a:t>
-            </a:r>
-          </a:p>
-          <a:p>
-            <a:endParaRPr/>
-          </a:p>
-          <a:p>
-            <a:r>
-              <a:t>Read what’s on slide</a:t>
-            </a:r>
-          </a:p>
-          <a:p>
-            <a:endParaRPr/>
-          </a:p>
-          <a:p>
-            <a:r>
-              <a:t>An example I like to give is to suppose your ADT is for a mode of transportation to get from point A to point B. Well as we both know there are many modes of transportation to get you from one place to another. Some specific modes of transportation might be walking, biking, taking a train and so on. These specific modes of transportation are analogous to the DSs themselves.</a:t>
-            </a:r>
-          </a:p>
-          <a:p>
-            <a:endParaRPr/>
-          </a:p>
-          <a:p>
-            <a:r>
-              <a:t>Let’s see some examples.</a:t>
-            </a:r>
+              <a:rPr lang="zh-CN" altLang="en-US" dirty="0"/>
+              <a:t>什么是抽象数据类型？它和数据结构有什么区别？好的，让我来回答这些问题：</a:t>
+            </a:r>
+            <a:endParaRPr lang="en-US" altLang="zh-CN" dirty="0"/>
+          </a:p>
+          <a:p>
+            <a:endParaRPr lang="en-US" altLang="zh-CN" dirty="0"/>
+          </a:p>
+          <a:p>
+            <a:r>
+              <a:rPr lang="zh-CN" altLang="en-US" dirty="0"/>
+              <a:t>抽象数据类型</a:t>
+            </a:r>
+            <a:r>
+              <a:rPr lang="en-US" altLang="zh-CN" dirty="0"/>
+              <a:t>(</a:t>
+            </a:r>
+            <a:r>
+              <a:rPr lang="zh-CN" altLang="en-US" dirty="0"/>
+              <a:t>英文称为</a:t>
+            </a:r>
+            <a:r>
+              <a:rPr lang="en-US" altLang="zh-CN" dirty="0"/>
+              <a:t>abstract data type</a:t>
+            </a:r>
+            <a:r>
+              <a:rPr lang="zh-CN" altLang="en-US" dirty="0"/>
+              <a:t>，简称</a:t>
+            </a:r>
+            <a:r>
+              <a:rPr lang="en-US" altLang="zh-CN" dirty="0"/>
+              <a:t>ADT)</a:t>
+            </a:r>
+            <a:r>
+              <a:rPr lang="zh-CN" altLang="en-US" dirty="0"/>
+              <a:t>，它是数据结构的一种抽象表示，它仅仅说明这个类型支持哪些接口，具体的数据结构实现必须遵循这些接口。</a:t>
+            </a:r>
+            <a:endParaRPr lang="en-US" altLang="zh-CN" dirty="0"/>
+          </a:p>
+          <a:p>
+            <a:endParaRPr lang="en-US" altLang="zh-CN" dirty="0"/>
+          </a:p>
+          <a:p>
+            <a:r>
+              <a:rPr lang="zh-CN" altLang="en-US" dirty="0"/>
+              <a:t>抽象数据类型只规范接口，并不规范具体的实现细节，也不规范具体采用哪种语言来实现。</a:t>
+            </a:r>
+            <a:endParaRPr lang="en-US" altLang="zh-CN" dirty="0"/>
+          </a:p>
+          <a:p>
+            <a:endParaRPr lang="en-US" altLang="zh-CN" dirty="0"/>
+          </a:p>
+          <a:p>
+            <a:r>
+              <a:rPr lang="zh-CN" altLang="en-US" dirty="0"/>
+              <a:t>举一个例子，说到这个</a:t>
+            </a:r>
+            <a:r>
+              <a:rPr lang="en-US" altLang="zh-CN" dirty="0"/>
+              <a:t>ADT</a:t>
+            </a:r>
+            <a:r>
+              <a:rPr lang="zh-CN" altLang="en-US" dirty="0"/>
+              <a:t>，我经常将它比喻为从地点</a:t>
+            </a:r>
+            <a:r>
+              <a:rPr lang="en-US" altLang="zh-CN" dirty="0"/>
+              <a:t>A</a:t>
+            </a:r>
+            <a:r>
+              <a:rPr lang="zh-CN" altLang="en-US" dirty="0"/>
+              <a:t>到地点</a:t>
+            </a:r>
+            <a:r>
+              <a:rPr lang="en-US" altLang="zh-CN" dirty="0"/>
+              <a:t>B</a:t>
+            </a:r>
+            <a:r>
+              <a:rPr lang="zh-CN" altLang="en-US" dirty="0"/>
+              <a:t>的运输方式。我们都知道，从地点</a:t>
+            </a:r>
+            <a:r>
+              <a:rPr lang="en-US" altLang="zh-CN" dirty="0"/>
+              <a:t>A</a:t>
+            </a:r>
+            <a:r>
+              <a:rPr lang="zh-CN" altLang="en-US" dirty="0"/>
+              <a:t>到地点</a:t>
+            </a:r>
+            <a:r>
+              <a:rPr lang="en-US" altLang="zh-CN" dirty="0"/>
+              <a:t>B</a:t>
+            </a:r>
+            <a:r>
+              <a:rPr lang="zh-CN" altLang="en-US" dirty="0"/>
+              <a:t>的运输方式有很多。一些具体的运输方式包括像走路，开车，或者通过火车等等。这些具体的运输方式就好比是数据结构。</a:t>
+            </a:r>
+            <a:endParaRPr lang="en-US" altLang="zh-CN" dirty="0"/>
+          </a:p>
+          <a:p>
+            <a:endParaRPr lang="en-US" altLang="zh-CN" dirty="0"/>
+          </a:p>
+          <a:p>
+            <a:r>
+              <a:rPr lang="zh-CN" altLang="en-US" dirty="0"/>
+              <a:t>下面我们来看一些例子。</a:t>
+            </a:r>
+            <a:endParaRPr dirty="0"/>
+          </a:p>
+          <a:p>
+            <a:endParaRPr dirty="0"/>
           </a:p>
         </p:txBody>
       </p:sp>
@@ -1693,36 +1829,158 @@
           <a:lstStyle/>
           <a:p>
             <a:r>
+              <a:rPr lang="en-US" altLang="zh-CN" dirty="0"/>
+              <a:t>PPT</a:t>
+            </a:r>
+            <a:r>
+              <a:rPr lang="zh-CN" altLang="en-US" dirty="0"/>
+              <a:t>的左边有一些抽象数据类型的例子，右边是具体的底层实现。比方说，列表</a:t>
+            </a:r>
+            <a:r>
+              <a:rPr lang="en-US" altLang="zh-CN" dirty="0"/>
+              <a:t>List</a:t>
+            </a:r>
+            <a:r>
+              <a:rPr lang="zh-CN" altLang="en-US" dirty="0"/>
+              <a:t>可以有两种实现方式，分别采用动态数组实现，或者采用链表来实现。它们都支持在列表中添加，移除和索引定位元素。</a:t>
+            </a:r>
+            <a:endParaRPr dirty="0"/>
+          </a:p>
+          <a:p>
+            <a:endParaRPr lang="en-US" altLang="zh-CN" dirty="0"/>
+          </a:p>
+          <a:p>
+            <a:r>
+              <a:rPr lang="zh-CN" altLang="en-US" dirty="0"/>
+              <a:t>再比如队列</a:t>
+            </a:r>
+            <a:r>
+              <a:rPr lang="en-US" altLang="zh-CN" dirty="0"/>
+              <a:t>Queue</a:t>
+            </a:r>
+            <a:r>
+              <a:rPr lang="zh-CN" altLang="en-US" dirty="0"/>
+              <a:t>和字典</a:t>
+            </a:r>
+            <a:r>
+              <a:rPr lang="en-US" altLang="zh-CN" dirty="0"/>
+              <a:t>Map</a:t>
+            </a:r>
+            <a:r>
+              <a:rPr lang="zh-CN" altLang="en-US" dirty="0"/>
+              <a:t>抽象数据类型，它们都可以有多种实现方式。注意，在队列</a:t>
+            </a:r>
+            <a:r>
+              <a:rPr lang="en-US" altLang="zh-CN" dirty="0"/>
+              <a:t>Queue</a:t>
+            </a:r>
+            <a:r>
+              <a:rPr lang="zh-CN" altLang="en-US" dirty="0"/>
+              <a:t>的实现方式中，我添加了基于栈的队列实现，实际上，我们确实可以用栈</a:t>
+            </a:r>
+            <a:r>
+              <a:rPr lang="en-US" altLang="zh-CN" dirty="0"/>
+              <a:t>Stack</a:t>
+            </a:r>
+            <a:r>
+              <a:rPr lang="zh-CN" altLang="en-US" dirty="0"/>
+              <a:t>来实现队列，虽然这种实现方式效率很差。</a:t>
+            </a:r>
+            <a:r>
               <a:rPr dirty="0"/>
-              <a:t>Here are some examples of ADTs on the left and the underlying implementation on the right hand side. As you can see a List can be implemented in two ways, you can have a dynamic array or a linked list. They both provide ways of adding, removing and indexing elements in a list.</a:t>
-            </a:r>
+              <a:t> </a:t>
+            </a:r>
+          </a:p>
+          <a:p>
+            <a:endParaRPr lang="en-US" altLang="zh-CN" dirty="0"/>
+          </a:p>
+          <a:p>
+            <a:r>
+              <a:rPr lang="zh-CN" altLang="en-US" dirty="0"/>
+              <a:t>最后，我还在表中加了交通工具</a:t>
+            </a:r>
+            <a:r>
+              <a:rPr lang="en-US" altLang="zh-CN" dirty="0"/>
+              <a:t>Vehicle</a:t>
+            </a:r>
+            <a:r>
+              <a:rPr lang="zh-CN" altLang="en-US" dirty="0"/>
+              <a:t>，这个只是为了形象说明，如果交通工具是一种抽象，那么它可以有多种具体的实现，包括高尔夫球车，自行车，还有智能汽车。这些具体的交通工具都可以移动，转弯，或者停车，等等。</a:t>
+            </a:r>
+            <a:endParaRPr lang="en-US" altLang="zh-CN" dirty="0"/>
+          </a:p>
+          <a:p>
+            <a:endParaRPr lang="en-US" altLang="zh-CN" dirty="0"/>
+          </a:p>
+          <a:p>
+            <a:r>
+              <a:rPr lang="zh-CN" altLang="en-US" dirty="0"/>
+              <a:t>在实际应用中，人们可能会经常会混用数据结构和抽象数据类型这两个概念，比方说</a:t>
+            </a:r>
+            <a:r>
+              <a:rPr lang="en-US" altLang="zh-CN" dirty="0"/>
+              <a:t>A</a:t>
+            </a:r>
+            <a:r>
+              <a:rPr lang="zh-CN" altLang="en-US" dirty="0"/>
+              <a:t>说</a:t>
+            </a:r>
+            <a:r>
+              <a:rPr lang="en-US" altLang="zh-CN" dirty="0"/>
+              <a:t>Map</a:t>
+            </a:r>
+            <a:r>
+              <a:rPr lang="zh-CN" altLang="en-US" dirty="0"/>
+              <a:t>，</a:t>
+            </a:r>
+            <a:r>
+              <a:rPr lang="en-US" altLang="zh-CN" dirty="0"/>
+              <a:t>B</a:t>
+            </a:r>
+            <a:r>
+              <a:rPr lang="zh-CN" altLang="en-US" dirty="0"/>
+              <a:t>说</a:t>
+            </a:r>
+            <a:r>
+              <a:rPr lang="en-US" altLang="zh-CN" dirty="0"/>
+              <a:t>hash map</a:t>
+            </a:r>
+            <a:r>
+              <a:rPr lang="zh-CN" altLang="en-US" dirty="0"/>
+              <a:t>，他们可能说得是同一个概念，但是经过我的解释，你现在可以理解两者的差异。</a:t>
+            </a:r>
+            <a:endParaRPr lang="en-US" altLang="zh-CN" dirty="0"/>
+          </a:p>
+          <a:p>
+            <a:endParaRPr lang="en-US" altLang="zh-CN" dirty="0"/>
+          </a:p>
+          <a:p>
+            <a:r>
+              <a:rPr lang="zh-CN" altLang="en-US" dirty="0"/>
+              <a:t>这里再强调一下，抽象数据类型仅定义它支持哪些行为，或者说方法，但是它并不定义这些方法具体是如何实现的。</a:t>
+            </a:r>
+            <a:endParaRPr lang="en-US" altLang="zh-CN" dirty="0"/>
+          </a:p>
+          <a:p>
+            <a:endParaRPr lang="en-US" altLang="zh-CN" dirty="0"/>
+          </a:p>
+          <a:p>
+            <a:r>
+              <a:rPr lang="zh-CN" altLang="en-US" dirty="0"/>
+              <a:t>好的，第一节课就讲这些内容，后续还有更多内容等着你学习。下节课我们会讲计算复杂度和</a:t>
+            </a:r>
+            <a:r>
+              <a:rPr lang="en-US" altLang="zh-CN" dirty="0"/>
+              <a:t>Big O</a:t>
+            </a:r>
+            <a:r>
+              <a:rPr lang="zh-CN" altLang="en-US" dirty="0"/>
+              <a:t>标记，我们下节课再见。</a:t>
+            </a:r>
+            <a:endParaRPr lang="en-US" altLang="zh-CN" dirty="0"/>
           </a:p>
           <a:p>
             <a:endParaRPr dirty="0"/>
-          </a:p>
-          <a:p>
-            <a:r>
-              <a:rPr dirty="0"/>
-              <a:t>Next we have a Queue and the Map ADTs which themselves can be implemented a variety of ways. Notice that under the implementation for Queue I put a Stack based Queue, because yes you can create a Queue with only Stacks. This is not the most efficient way to implement a Queue, but it does work and it is possible. </a:t>
-            </a:r>
-          </a:p>
-          <a:p>
-            <a:endParaRPr dirty="0"/>
-          </a:p>
-          <a:p>
-            <a:r>
-              <a:rPr dirty="0"/>
-              <a:t>The point here is that the ADT only defines how a DS should behave and what methods it should have but not the details on how those methods are implemented. </a:t>
-            </a:r>
-          </a:p>
-          <a:p>
-            <a:endParaRPr dirty="0"/>
-          </a:p>
-          <a:p>
-            <a:r>
-              <a:rPr dirty="0"/>
-              <a:t>That’s all for this first video, there will be many more to come, thank you for watching.</a:t>
-            </a:r>
           </a:p>
         </p:txBody>
       </p:sp>
@@ -1793,25 +2051,7 @@
           <a:bodyPr/>
           <a:lstStyle/>
           <a:p>
-            <a:r>
-              <a:t>Here are some examples of ADTs on the left and the underlying implementation on the right hand side. So as you can see a List can be implemented in many many ways, you can have a list as a static or dynamic array or even as a linked list they all provide ways of adding, removing and indexing elements in a list. </a:t>
-            </a:r>
-          </a:p>
-          <a:p>
-            <a:endParaRPr/>
-          </a:p>
-          <a:p>
-            <a:r>
-              <a:t>Next we have a Queue and the Map ADTs which themselves can be implemented a variety of ways. Notice that under the implementation for Queue I put Stack based Queue, well yes you can create a Queue with only Stacks, I was asked that question when I interviewed with Google, ps I got the job, but I’m not saying that it’s the most efficient way to implement a Queue, but it does work and it is possible. </a:t>
-            </a:r>
-          </a:p>
-          <a:p>
-            <a:endParaRPr/>
-          </a:p>
-          <a:p>
-            <a:r>
-              <a:t>Lastly I put vehicle there just to prove a point. If the abstraction is a vehicle there are many ways you can construct a vehicle that can do things like move around, park, turn etc.. So concrete things that can do this are Golf Carts, Smarts Cars and Bikes. Often however you will see that data structures and ADTs are used interchangeably used amongst people to refer to the same thing, so one might say Map and another might say hash map but they’re really talking about the same thing.</a:t>
-            </a:r>
+            <a:endParaRPr dirty="0"/>
           </a:p>
         </p:txBody>
       </p:sp>
@@ -3660,7 +3900,7 @@
           </a:ln>
           <a:extLst>
             <a:ext uri="{C572A759-6A51-4108-AA02-DFA0A04FC94B}">
-              <ma14:wrappingTextBoxFlag xmlns:ma14="http://schemas.microsoft.com/office/mac/drawingml/2011/main" xmlns="" val="1"/>
+              <ma14:wrappingTextBoxFlag xmlns="" xmlns:ma14="http://schemas.microsoft.com/office/mac/drawingml/2011/main" val="1"/>
             </a:ext>
           </a:extLst>
         </p:spPr>
@@ -3699,7 +3939,7 @@
           </a:ln>
           <a:extLst>
             <a:ext uri="{C572A759-6A51-4108-AA02-DFA0A04FC94B}">
-              <ma14:wrappingTextBoxFlag xmlns:ma14="http://schemas.microsoft.com/office/mac/drawingml/2011/main" xmlns="" val="1"/>
+              <ma14:wrappingTextBoxFlag xmlns="" xmlns:ma14="http://schemas.microsoft.com/office/mac/drawingml/2011/main" val="1"/>
             </a:ext>
           </a:extLst>
         </p:spPr>
@@ -4780,7 +5020,7 @@
           </a:ln>
           <a:extLst>
             <a:ext uri="{C572A759-6A51-4108-AA02-DFA0A04FC94B}">
-              <ma14:wrappingTextBoxFlag xmlns:ma14="http://schemas.microsoft.com/office/mac/drawingml/2011/main" xmlns="" val="1"/>
+              <ma14:wrappingTextBoxFlag xmlns="" xmlns:ma14="http://schemas.microsoft.com/office/mac/drawingml/2011/main" val="1"/>
             </a:ext>
           </a:extLst>
         </p:spPr>
@@ -4929,7 +5169,7 @@
           </a:ln>
           <a:extLst>
             <a:ext uri="{C572A759-6A51-4108-AA02-DFA0A04FC94B}">
-              <ma14:wrappingTextBoxFlag xmlns:ma14="http://schemas.microsoft.com/office/mac/drawingml/2011/main" xmlns="" val="1"/>
+              <ma14:wrappingTextBoxFlag xmlns="" xmlns:ma14="http://schemas.microsoft.com/office/mac/drawingml/2011/main" val="1"/>
             </a:ext>
           </a:extLst>
         </p:spPr>
@@ -4991,7 +5231,7 @@
           </a:ln>
           <a:extLst>
             <a:ext uri="{C572A759-6A51-4108-AA02-DFA0A04FC94B}">
-              <ma14:wrappingTextBoxFlag xmlns:ma14="http://schemas.microsoft.com/office/mac/drawingml/2011/main" xmlns="" val="1"/>
+              <ma14:wrappingTextBoxFlag xmlns="" xmlns:ma14="http://schemas.microsoft.com/office/mac/drawingml/2011/main" val="1"/>
             </a:ext>
           </a:extLst>
         </p:spPr>
@@ -5522,7 +5762,7 @@
           </a:ln>
           <a:extLst>
             <a:ext uri="{C572A759-6A51-4108-AA02-DFA0A04FC94B}">
-              <ma14:wrappingTextBoxFlag xmlns:ma14="http://schemas.microsoft.com/office/mac/drawingml/2011/main" xmlns="" val="1"/>
+              <ma14:wrappingTextBoxFlag xmlns="" xmlns:ma14="http://schemas.microsoft.com/office/mac/drawingml/2011/main" val="1"/>
             </a:ext>
           </a:extLst>
         </p:spPr>
@@ -5566,7 +5806,7 @@
           </a:ln>
           <a:extLst>
             <a:ext uri="{C572A759-6A51-4108-AA02-DFA0A04FC94B}">
-              <ma14:wrappingTextBoxFlag xmlns:ma14="http://schemas.microsoft.com/office/mac/drawingml/2011/main" xmlns="" val="1"/>
+              <ma14:wrappingTextBoxFlag xmlns="" xmlns:ma14="http://schemas.microsoft.com/office/mac/drawingml/2011/main" val="1"/>
             </a:ext>
           </a:extLst>
         </p:spPr>
@@ -5623,7 +5863,7 @@
           </a:ln>
           <a:extLst>
             <a:ext uri="{C572A759-6A51-4108-AA02-DFA0A04FC94B}">
-              <ma14:wrappingTextBoxFlag xmlns:ma14="http://schemas.microsoft.com/office/mac/drawingml/2011/main" xmlns="" val="1"/>
+              <ma14:wrappingTextBoxFlag xmlns="" xmlns:ma14="http://schemas.microsoft.com/office/mac/drawingml/2011/main" val="1"/>
             </a:ext>
           </a:extLst>
         </p:spPr>
@@ -5770,7 +6010,7 @@
           </a:ln>
           <a:extLst>
             <a:ext uri="{C572A759-6A51-4108-AA02-DFA0A04FC94B}">
-              <ma14:wrappingTextBoxFlag xmlns:ma14="http://schemas.microsoft.com/office/mac/drawingml/2011/main" xmlns="" val="1"/>
+              <ma14:wrappingTextBoxFlag xmlns="" xmlns:ma14="http://schemas.microsoft.com/office/mac/drawingml/2011/main" val="1"/>
             </a:ext>
           </a:extLst>
         </p:spPr>
@@ -5882,7 +6122,7 @@
           </a:ln>
           <a:extLst>
             <a:ext uri="{C572A759-6A51-4108-AA02-DFA0A04FC94B}">
-              <ma14:wrappingTextBoxFlag xmlns:ma14="http://schemas.microsoft.com/office/mac/drawingml/2011/main" xmlns="" val="1"/>
+              <ma14:wrappingTextBoxFlag xmlns="" xmlns:ma14="http://schemas.microsoft.com/office/mac/drawingml/2011/main" val="1"/>
             </a:ext>
           </a:extLst>
         </p:spPr>
@@ -5936,7 +6176,7 @@
           </a:ln>
           <a:extLst>
             <a:ext uri="{C572A759-6A51-4108-AA02-DFA0A04FC94B}">
-              <ma14:wrappingTextBoxFlag xmlns:ma14="http://schemas.microsoft.com/office/mac/drawingml/2011/main" xmlns="" val="1"/>
+              <ma14:wrappingTextBoxFlag xmlns="" xmlns:ma14="http://schemas.microsoft.com/office/mac/drawingml/2011/main" val="1"/>
             </a:ext>
           </a:extLst>
         </p:spPr>
@@ -5995,7 +6235,7 @@
           </a:ln>
           <a:extLst>
             <a:ext uri="{C572A759-6A51-4108-AA02-DFA0A04FC94B}">
-              <ma14:wrappingTextBoxFlag xmlns:ma14="http://schemas.microsoft.com/office/mac/drawingml/2011/main" xmlns="" val="1"/>
+              <ma14:wrappingTextBoxFlag xmlns="" xmlns:ma14="http://schemas.microsoft.com/office/mac/drawingml/2011/main" val="1"/>
             </a:ext>
           </a:extLst>
         </p:spPr>
@@ -6142,7 +6382,7 @@
           </a:ln>
           <a:extLst>
             <a:ext uri="{C572A759-6A51-4108-AA02-DFA0A04FC94B}">
-              <ma14:wrappingTextBoxFlag xmlns:ma14="http://schemas.microsoft.com/office/mac/drawingml/2011/main" xmlns="" val="1"/>
+              <ma14:wrappingTextBoxFlag xmlns="" xmlns:ma14="http://schemas.microsoft.com/office/mac/drawingml/2011/main" val="1"/>
             </a:ext>
           </a:extLst>
         </p:spPr>
@@ -6228,7 +6468,7 @@
           </a:ln>
           <a:extLst>
             <a:ext uri="{C572A759-6A51-4108-AA02-DFA0A04FC94B}">
-              <ma14:wrappingTextBoxFlag xmlns:ma14="http://schemas.microsoft.com/office/mac/drawingml/2011/main" xmlns="" val="1"/>
+              <ma14:wrappingTextBoxFlag xmlns="" xmlns:ma14="http://schemas.microsoft.com/office/mac/drawingml/2011/main" val="1"/>
             </a:ext>
           </a:extLst>
         </p:spPr>
@@ -6283,7 +6523,7 @@
           </a:ln>
           <a:extLst>
             <a:ext uri="{C572A759-6A51-4108-AA02-DFA0A04FC94B}">
-              <ma14:wrappingTextBoxFlag xmlns:ma14="http://schemas.microsoft.com/office/mac/drawingml/2011/main" xmlns="" val="1"/>
+              <ma14:wrappingTextBoxFlag xmlns="" xmlns:ma14="http://schemas.microsoft.com/office/mac/drawingml/2011/main" val="1"/>
             </a:ext>
           </a:extLst>
         </p:spPr>
@@ -6369,7 +6609,7 @@
           </a:ln>
           <a:extLst>
             <a:ext uri="{C572A759-6A51-4108-AA02-DFA0A04FC94B}">
-              <ma14:wrappingTextBoxFlag xmlns:ma14="http://schemas.microsoft.com/office/mac/drawingml/2011/main" xmlns="" val="1"/>
+              <ma14:wrappingTextBoxFlag xmlns="" xmlns:ma14="http://schemas.microsoft.com/office/mac/drawingml/2011/main" val="1"/>
             </a:ext>
           </a:extLst>
         </p:spPr>
@@ -6421,7 +6661,7 @@
           </a:ln>
           <a:extLst>
             <a:ext uri="{C572A759-6A51-4108-AA02-DFA0A04FC94B}">
-              <ma14:wrappingTextBoxFlag xmlns:ma14="http://schemas.microsoft.com/office/mac/drawingml/2011/main" xmlns="" val="1"/>
+              <ma14:wrappingTextBoxFlag xmlns="" xmlns:ma14="http://schemas.microsoft.com/office/mac/drawingml/2011/main" val="1"/>
             </a:ext>
           </a:extLst>
         </p:spPr>
@@ -6534,7 +6774,7 @@
           </a:ln>
           <a:extLst>
             <a:ext uri="{C572A759-6A51-4108-AA02-DFA0A04FC94B}">
-              <ma14:wrappingTextBoxFlag xmlns:ma14="http://schemas.microsoft.com/office/mac/drawingml/2011/main" xmlns="" val="1"/>
+              <ma14:wrappingTextBoxFlag xmlns="" xmlns:ma14="http://schemas.microsoft.com/office/mac/drawingml/2011/main" val="1"/>
             </a:ext>
           </a:extLst>
         </p:spPr>
@@ -6588,7 +6828,7 @@
           </a:ln>
           <a:extLst>
             <a:ext uri="{C572A759-6A51-4108-AA02-DFA0A04FC94B}">
-              <ma14:wrappingTextBoxFlag xmlns:ma14="http://schemas.microsoft.com/office/mac/drawingml/2011/main" xmlns="" val="1"/>
+              <ma14:wrappingTextBoxFlag xmlns="" xmlns:ma14="http://schemas.microsoft.com/office/mac/drawingml/2011/main" val="1"/>
             </a:ext>
           </a:extLst>
         </p:spPr>
@@ -6654,7 +6894,7 @@
           </a:ln>
           <a:extLst>
             <a:ext uri="{C572A759-6A51-4108-AA02-DFA0A04FC94B}">
-              <ma14:wrappingTextBoxFlag xmlns:ma14="http://schemas.microsoft.com/office/mac/drawingml/2011/main" xmlns="" val="1"/>
+              <ma14:wrappingTextBoxFlag xmlns="" xmlns:ma14="http://schemas.microsoft.com/office/mac/drawingml/2011/main" val="1"/>
             </a:ext>
           </a:extLst>
         </p:spPr>
@@ -6708,7 +6948,7 @@
           </a:ln>
           <a:extLst>
             <a:ext uri="{C572A759-6A51-4108-AA02-DFA0A04FC94B}">
-              <ma14:wrappingTextBoxFlag xmlns:ma14="http://schemas.microsoft.com/office/mac/drawingml/2011/main" xmlns="" val="1"/>
+              <ma14:wrappingTextBoxFlag xmlns="" xmlns:ma14="http://schemas.microsoft.com/office/mac/drawingml/2011/main" val="1"/>
             </a:ext>
           </a:extLst>
         </p:spPr>
@@ -6772,7 +7012,7 @@
           </a:ln>
           <a:extLst>
             <a:ext uri="{C572A759-6A51-4108-AA02-DFA0A04FC94B}">
-              <ma14:wrappingTextBoxFlag xmlns:ma14="http://schemas.microsoft.com/office/mac/drawingml/2011/main" xmlns="" val="1"/>
+              <ma14:wrappingTextBoxFlag xmlns="" xmlns:ma14="http://schemas.microsoft.com/office/mac/drawingml/2011/main" val="1"/>
             </a:ext>
           </a:extLst>
         </p:spPr>
@@ -6886,7 +7126,7 @@
           </a:ln>
           <a:extLst>
             <a:ext uri="{C572A759-6A51-4108-AA02-DFA0A04FC94B}">
-              <ma14:wrappingTextBoxFlag xmlns:ma14="http://schemas.microsoft.com/office/mac/drawingml/2011/main" xmlns="" val="1"/>
+              <ma14:wrappingTextBoxFlag xmlns="" xmlns:ma14="http://schemas.microsoft.com/office/mac/drawingml/2011/main" val="1"/>
             </a:ext>
           </a:extLst>
         </p:spPr>
@@ -6941,7 +7181,7 @@
           </a:ln>
           <a:extLst>
             <a:ext uri="{C572A759-6A51-4108-AA02-DFA0A04FC94B}">
-              <ma14:wrappingTextBoxFlag xmlns:ma14="http://schemas.microsoft.com/office/mac/drawingml/2011/main" xmlns="" val="1"/>
+              <ma14:wrappingTextBoxFlag xmlns="" xmlns:ma14="http://schemas.microsoft.com/office/mac/drawingml/2011/main" val="1"/>
             </a:ext>
           </a:extLst>
         </p:spPr>
@@ -7080,7 +7320,7 @@
           </a:ln>
           <a:extLst>
             <a:ext uri="{C572A759-6A51-4108-AA02-DFA0A04FC94B}">
-              <ma14:wrappingTextBoxFlag xmlns:ma14="http://schemas.microsoft.com/office/mac/drawingml/2011/main" xmlns="" val="1"/>
+              <ma14:wrappingTextBoxFlag xmlns="" xmlns:ma14="http://schemas.microsoft.com/office/mac/drawingml/2011/main" val="1"/>
             </a:ext>
           </a:extLst>
         </p:spPr>
@@ -7373,7 +7613,7 @@
           </a:ln>
           <a:extLst>
             <a:ext uri="{C572A759-6A51-4108-AA02-DFA0A04FC94B}">
-              <ma14:wrappingTextBoxFlag xmlns:ma14="http://schemas.microsoft.com/office/mac/drawingml/2011/main" xmlns="" val="1"/>
+              <ma14:wrappingTextBoxFlag xmlns="" xmlns:ma14="http://schemas.microsoft.com/office/mac/drawingml/2011/main" val="1"/>
             </a:ext>
           </a:extLst>
         </p:spPr>
@@ -7427,7 +7667,7 @@
           </a:ln>
           <a:extLst>
             <a:ext uri="{C572A759-6A51-4108-AA02-DFA0A04FC94B}">
-              <ma14:wrappingTextBoxFlag xmlns:ma14="http://schemas.microsoft.com/office/mac/drawingml/2011/main" xmlns="" val="1"/>
+              <ma14:wrappingTextBoxFlag xmlns="" xmlns:ma14="http://schemas.microsoft.com/office/mac/drawingml/2011/main" val="1"/>
             </a:ext>
           </a:extLst>
         </p:spPr>
@@ -7542,7 +7782,7 @@
           </a:ln>
           <a:extLst>
             <a:ext uri="{C572A759-6A51-4108-AA02-DFA0A04FC94B}">
-              <ma14:wrappingTextBoxFlag xmlns:ma14="http://schemas.microsoft.com/office/mac/drawingml/2011/main" xmlns="" val="1"/>
+              <ma14:wrappingTextBoxFlag xmlns="" xmlns:ma14="http://schemas.microsoft.com/office/mac/drawingml/2011/main" val="1"/>
             </a:ext>
           </a:extLst>
         </p:spPr>
@@ -7583,7 +7823,7 @@
           </a:ln>
           <a:extLst>
             <a:ext uri="{C572A759-6A51-4108-AA02-DFA0A04FC94B}">
-              <ma14:wrappingTextBoxFlag xmlns:ma14="http://schemas.microsoft.com/office/mac/drawingml/2011/main" xmlns="" val="1"/>
+              <ma14:wrappingTextBoxFlag xmlns="" xmlns:ma14="http://schemas.microsoft.com/office/mac/drawingml/2011/main" val="1"/>
             </a:ext>
           </a:extLst>
         </p:spPr>
@@ -7832,7 +8072,7 @@
           </a:ln>
           <a:extLst>
             <a:ext uri="{C572A759-6A51-4108-AA02-DFA0A04FC94B}">
-              <ma14:wrappingTextBoxFlag xmlns:ma14="http://schemas.microsoft.com/office/mac/drawingml/2011/main" xmlns="" val="1"/>
+              <ma14:wrappingTextBoxFlag xmlns="" xmlns:ma14="http://schemas.microsoft.com/office/mac/drawingml/2011/main" val="1"/>
             </a:ext>
           </a:extLst>
         </p:spPr>
@@ -8033,7 +8273,7 @@
           </a:ln>
           <a:extLst>
             <a:ext uri="{C572A759-6A51-4108-AA02-DFA0A04FC94B}">
-              <ma14:wrappingTextBoxFlag xmlns:ma14="http://schemas.microsoft.com/office/mac/drawingml/2011/main" xmlns="" val="1"/>
+              <ma14:wrappingTextBoxFlag xmlns="" xmlns:ma14="http://schemas.microsoft.com/office/mac/drawingml/2011/main" val="1"/>
             </a:ext>
           </a:extLst>
         </p:spPr>
@@ -8245,7 +8485,7 @@
           </a:ln>
           <a:extLst>
             <a:ext uri="{C572A759-6A51-4108-AA02-DFA0A04FC94B}">
-              <ma14:wrappingTextBoxFlag xmlns:ma14="http://schemas.microsoft.com/office/mac/drawingml/2011/main" xmlns="" val="1"/>
+              <ma14:wrappingTextBoxFlag xmlns="" xmlns:ma14="http://schemas.microsoft.com/office/mac/drawingml/2011/main" val="1"/>
             </a:ext>
           </a:extLst>
         </p:spPr>
@@ -8463,7 +8703,7 @@
           </a:ln>
           <a:extLst>
             <a:ext uri="{C572A759-6A51-4108-AA02-DFA0A04FC94B}">
-              <ma14:wrappingTextBoxFlag xmlns:ma14="http://schemas.microsoft.com/office/mac/drawingml/2011/main" xmlns="" val="1"/>
+              <ma14:wrappingTextBoxFlag xmlns="" xmlns:ma14="http://schemas.microsoft.com/office/mac/drawingml/2011/main" val="1"/>
             </a:ext>
           </a:extLst>
         </p:spPr>
@@ -8675,7 +8915,7 @@
           </a:ln>
           <a:extLst>
             <a:ext uri="{C572A759-6A51-4108-AA02-DFA0A04FC94B}">
-              <ma14:wrappingTextBoxFlag xmlns:ma14="http://schemas.microsoft.com/office/mac/drawingml/2011/main" xmlns="" val="1"/>
+              <ma14:wrappingTextBoxFlag xmlns="" xmlns:ma14="http://schemas.microsoft.com/office/mac/drawingml/2011/main" val="1"/>
             </a:ext>
           </a:extLst>
         </p:spPr>
@@ -8905,7 +9145,7 @@
           </a:ln>
           <a:extLst>
             <a:ext uri="{C572A759-6A51-4108-AA02-DFA0A04FC94B}">
-              <ma14:wrappingTextBoxFlag xmlns:ma14="http://schemas.microsoft.com/office/mac/drawingml/2011/main" xmlns="" val="1"/>
+              <ma14:wrappingTextBoxFlag xmlns="" xmlns:ma14="http://schemas.microsoft.com/office/mac/drawingml/2011/main" val="1"/>
             </a:ext>
           </a:extLst>
         </p:spPr>
@@ -9014,7 +9254,7 @@
           </a:ln>
           <a:extLst>
             <a:ext uri="{C572A759-6A51-4108-AA02-DFA0A04FC94B}">
-              <ma14:wrappingTextBoxFlag xmlns:ma14="http://schemas.microsoft.com/office/mac/drawingml/2011/main" xmlns="" val="1"/>
+              <ma14:wrappingTextBoxFlag xmlns="" xmlns:ma14="http://schemas.microsoft.com/office/mac/drawingml/2011/main" val="1"/>
             </a:ext>
           </a:extLst>
         </p:spPr>
@@ -9559,7 +9799,7 @@
           </a:ln>
           <a:extLst>
             <a:ext uri="{C572A759-6A51-4108-AA02-DFA0A04FC94B}">
-              <ma14:wrappingTextBoxFlag xmlns:ma14="http://schemas.microsoft.com/office/mac/drawingml/2011/main" xmlns="" val="1"/>
+              <ma14:wrappingTextBoxFlag xmlns="" xmlns:ma14="http://schemas.microsoft.com/office/mac/drawingml/2011/main" val="1"/>
             </a:ext>
           </a:extLst>
         </p:spPr>
@@ -10293,7 +10533,7 @@
           </a:ln>
           <a:extLst>
             <a:ext uri="{C572A759-6A51-4108-AA02-DFA0A04FC94B}">
-              <ma14:wrappingTextBoxFlag xmlns:ma14="http://schemas.microsoft.com/office/mac/drawingml/2011/main" xmlns="" val="1"/>
+              <ma14:wrappingTextBoxFlag xmlns="" xmlns:ma14="http://schemas.microsoft.com/office/mac/drawingml/2011/main" val="1"/>
             </a:ext>
           </a:extLst>
         </p:spPr>
@@ -10337,7 +10577,7 @@
           </a:ln>
           <a:extLst>
             <a:ext uri="{C572A759-6A51-4108-AA02-DFA0A04FC94B}">
-              <ma14:wrappingTextBoxFlag xmlns:ma14="http://schemas.microsoft.com/office/mac/drawingml/2011/main" xmlns="" val="1"/>
+              <ma14:wrappingTextBoxFlag xmlns="" xmlns:ma14="http://schemas.microsoft.com/office/mac/drawingml/2011/main" val="1"/>
             </a:ext>
           </a:extLst>
         </p:spPr>
@@ -10579,7 +10819,7 @@
           </a:ln>
           <a:extLst>
             <a:ext uri="{C572A759-6A51-4108-AA02-DFA0A04FC94B}">
-              <ma14:wrappingTextBoxFlag xmlns:ma14="http://schemas.microsoft.com/office/mac/drawingml/2011/main" xmlns="" val="1"/>
+              <ma14:wrappingTextBoxFlag xmlns="" xmlns:ma14="http://schemas.microsoft.com/office/mac/drawingml/2011/main" val="1"/>
             </a:ext>
           </a:extLst>
         </p:spPr>
@@ -10620,7 +10860,7 @@
           </a:ln>
           <a:extLst>
             <a:ext uri="{C572A759-6A51-4108-AA02-DFA0A04FC94B}">
-              <ma14:wrappingTextBoxFlag xmlns:ma14="http://schemas.microsoft.com/office/mac/drawingml/2011/main" xmlns="" val="1"/>
+              <ma14:wrappingTextBoxFlag xmlns="" xmlns:ma14="http://schemas.microsoft.com/office/mac/drawingml/2011/main" val="1"/>
             </a:ext>
           </a:extLst>
         </p:spPr>

</xml_diff>